<commit_message>
Seminar Project Feedback Upload
</commit_message>
<xml_diff>
--- a/Java/Java_Project/src/seminar_project/ClassStructure.pptx
+++ b/Java/Java_Project/src/seminar_project/ClassStructure.pptx
@@ -3544,7 +3544,7 @@
         </p:nvSpPr>
         <p:spPr>
           <a:xfrm>
-            <a:off x="8766735" y="2443845"/>
+            <a:off x="8582783" y="2387478"/>
             <a:ext cx="1619723" cy="831691"/>
           </a:xfrm>
           <a:prstGeom prst="rect">
@@ -3605,6 +3605,9 @@
             <a:avLst/>
           </a:prstGeom>
           <a:ln w="38100">
+            <a:solidFill>
+              <a:schemeClr val="accent6"/>
+            </a:solidFill>
             <a:headEnd w="sm" len="lg"/>
             <a:tailEnd type="triangle"/>
           </a:ln>
@@ -3649,6 +3652,9 @@
             <a:avLst/>
           </a:prstGeom>
           <a:ln w="38100">
+            <a:solidFill>
+              <a:schemeClr val="accent6"/>
+            </a:solidFill>
             <a:headEnd w="sm" len="lg"/>
             <a:tailEnd type="triangle"/>
           </a:ln>
@@ -3693,6 +3699,9 @@
             <a:avLst/>
           </a:prstGeom>
           <a:ln w="38100">
+            <a:solidFill>
+              <a:schemeClr val="accent6"/>
+            </a:solidFill>
             <a:headEnd w="sm" len="lg"/>
             <a:tailEnd type="triangle"/>
           </a:ln>
@@ -3884,7 +3893,7 @@
         </p:nvSpPr>
         <p:spPr>
           <a:xfrm>
-            <a:off x="9209096" y="3013154"/>
+            <a:off x="10146587" y="2485870"/>
             <a:ext cx="1619723" cy="831691"/>
           </a:xfrm>
           <a:prstGeom prst="rect">
@@ -3948,7 +3957,7 @@
         </p:nvSpPr>
         <p:spPr>
           <a:xfrm>
-            <a:off x="1715842" y="3012344"/>
+            <a:off x="1235551" y="2485871"/>
             <a:ext cx="1619723" cy="831691"/>
           </a:xfrm>
           <a:prstGeom prst="rect">
@@ -4216,8 +4225,8 @@
         </p:nvCxnSpPr>
         <p:spPr>
           <a:xfrm>
-            <a:off x="3335565" y="3428190"/>
-            <a:ext cx="452335" cy="721055"/>
+            <a:off x="2855274" y="2901717"/>
+            <a:ext cx="932626" cy="1247528"/>
           </a:xfrm>
           <a:prstGeom prst="straightConnector1">
             <a:avLst/>
@@ -4265,8 +4274,8 @@
         </p:nvCxnSpPr>
         <p:spPr>
           <a:xfrm flipH="1">
-            <a:off x="8647069" y="3429000"/>
-            <a:ext cx="562027" cy="720246"/>
+            <a:off x="8647069" y="2901716"/>
+            <a:ext cx="1499518" cy="1247530"/>
           </a:xfrm>
           <a:prstGeom prst="straightConnector1">
             <a:avLst/>
@@ -4408,7 +4417,7 @@
         </p:nvSpPr>
         <p:spPr>
           <a:xfrm>
-            <a:off x="5407623" y="789701"/>
+            <a:off x="5415419" y="373856"/>
             <a:ext cx="1619723" cy="831691"/>
           </a:xfrm>
           <a:prstGeom prst="rect">
@@ -4476,8 +4485,8 @@
         </p:nvCxnSpPr>
         <p:spPr>
           <a:xfrm flipV="1">
-            <a:off x="2525704" y="1205547"/>
-            <a:ext cx="2881919" cy="1806797"/>
+            <a:off x="2045413" y="789702"/>
+            <a:ext cx="3370006" cy="1696169"/>
           </a:xfrm>
           <a:prstGeom prst="straightConnector1">
             <a:avLst/>
@@ -4519,8 +4528,8 @@
         </p:nvCxnSpPr>
         <p:spPr>
           <a:xfrm flipH="1" flipV="1">
-            <a:off x="7027346" y="1205547"/>
-            <a:ext cx="2991612" cy="1807607"/>
+            <a:off x="7035142" y="789702"/>
+            <a:ext cx="3921307" cy="1696168"/>
           </a:xfrm>
           <a:prstGeom prst="straightConnector1">
             <a:avLst/>
@@ -4561,9 +4570,9 @@
           <p:nvPr/>
         </p:nvCxnSpPr>
         <p:spPr>
-          <a:xfrm>
-            <a:off x="6217485" y="1621392"/>
-            <a:ext cx="0" cy="711866"/>
+          <a:xfrm flipH="1">
+            <a:off x="6217485" y="1205547"/>
+            <a:ext cx="7796" cy="1127711"/>
           </a:xfrm>
           <a:prstGeom prst="straightConnector1">
             <a:avLst/>

</xml_diff>